<commit_message>
CSS Datepicker Registros Imagenes en registros Registrarme Otros cambios menores
</commit_message>
<xml_diff>
--- a/Documentación/Presentaciones PPT/Tesis 2 - Mendez Presentación Parcial.pptx
+++ b/Documentación/Presentaciones PPT/Tesis 2 - Mendez Presentación Parcial.pptx
@@ -4864,22 +4864,22 @@
     </dgm:pt>
   </dgm:ptLst>
   <dgm:cxnLst>
+    <dgm:cxn modelId="{78C0F103-0BC0-46BC-BBBC-D58341736E99}" type="presOf" srcId="{5D56325C-A28C-4982-810F-F3CCECEC2E7D}" destId="{3C682040-43AF-4BE8-950E-E13003E6C6C7}" srcOrd="0" destOrd="0" presId="urn:microsoft.com/office/officeart/2005/8/layout/list1"/>
+    <dgm:cxn modelId="{2206174B-0967-4701-B7BB-572D079B3A22}" srcId="{3BFDB7AE-EA70-4208-99E4-6652F73E09AF}" destId="{5D56325C-A28C-4982-810F-F3CCECEC2E7D}" srcOrd="0" destOrd="0" parTransId="{5D99972C-BEA3-4759-BAAC-F0514ABC1FE1}" sibTransId="{ECCC7701-505F-42F0-B3C4-E9890A7BB77B}"/>
+    <dgm:cxn modelId="{C611089B-F9C4-4CB8-A2DC-4A6E2B8ECF02}" srcId="{924689B8-E4E2-4802-BC6B-5B17E3AC8DDF}" destId="{A43E1EE4-EA84-469B-B8E9-F87184BCD406}" srcOrd="0" destOrd="0" parTransId="{B5EEE765-35D4-4DF0-BFEC-78B63BE24D65}" sibTransId="{DFDEAEA3-03A5-44E8-ACA1-35C31669F285}"/>
+    <dgm:cxn modelId="{FB20BC1E-834C-48C0-BD4E-04A5E0873844}" srcId="{4D5D3E7B-9F50-4387-AFBC-12316FB9B2E8}" destId="{4C11F0D3-B1D8-41E5-B4ED-D28D5406ED7A}" srcOrd="0" destOrd="0" parTransId="{C60CEBD2-531F-45D5-9CB2-1FBB715F4879}" sibTransId="{A1BF3405-CB09-4D5F-AAD9-E76A127FDC0C}"/>
+    <dgm:cxn modelId="{4219486A-1AA6-4D7C-8DCD-F38DE310E10B}" type="presOf" srcId="{924689B8-E4E2-4802-BC6B-5B17E3AC8DDF}" destId="{E2ADE456-C079-4778-88D3-2ABF030BE345}" srcOrd="0" destOrd="0" presId="urn:microsoft.com/office/officeart/2005/8/layout/list1"/>
+    <dgm:cxn modelId="{26882D24-1258-440C-9950-32BA7E116E89}" type="presOf" srcId="{A43E1EE4-EA84-469B-B8E9-F87184BCD406}" destId="{FC04ED5C-48CE-49A3-98DF-4CA3B004B014}" srcOrd="0" destOrd="0" presId="urn:microsoft.com/office/officeart/2005/8/layout/list1"/>
+    <dgm:cxn modelId="{108E09CC-8703-4C9A-9F4C-239B367EEF86}" type="presOf" srcId="{3BFDB7AE-EA70-4208-99E4-6652F73E09AF}" destId="{501DDC76-9B9F-4697-8027-10EB121BC8A9}" srcOrd="1" destOrd="0" presId="urn:microsoft.com/office/officeart/2005/8/layout/list1"/>
+    <dgm:cxn modelId="{5D020E2A-D409-452B-ABB3-0EFE3A92652C}" type="presOf" srcId="{4C11F0D3-B1D8-41E5-B4ED-D28D5406ED7A}" destId="{C94856A0-C8B1-4244-B645-C266926A0AAB}" srcOrd="0" destOrd="0" presId="urn:microsoft.com/office/officeart/2005/8/layout/list1"/>
+    <dgm:cxn modelId="{9738BE00-F026-4DB2-B7F4-EA1061D3A7FF}" type="presOf" srcId="{3BFDB7AE-EA70-4208-99E4-6652F73E09AF}" destId="{0F91977E-FD5F-4F09-AD28-B3380115D8C3}" srcOrd="0" destOrd="0" presId="urn:microsoft.com/office/officeart/2005/8/layout/list1"/>
+    <dgm:cxn modelId="{D348ABC0-E7C5-475A-B6F1-B134560759E1}" type="presOf" srcId="{4D5D3E7B-9F50-4387-AFBC-12316FB9B2E8}" destId="{F126904A-86E7-4DEB-A715-98702053D074}" srcOrd="0" destOrd="0" presId="urn:microsoft.com/office/officeart/2005/8/layout/list1"/>
+    <dgm:cxn modelId="{3B487C66-25D7-4E41-A5C2-F42C47637A7A}" type="presOf" srcId="{924689B8-E4E2-4802-BC6B-5B17E3AC8DDF}" destId="{E74DBF66-3AE1-4F14-A029-A5F2D0C36F78}" srcOrd="1" destOrd="0" presId="urn:microsoft.com/office/officeart/2005/8/layout/list1"/>
+    <dgm:cxn modelId="{A1CD1BE4-A834-4463-86D1-583A19E39584}" type="presOf" srcId="{9BF01063-3BAB-4F4D-ADE8-387A89D22F7C}" destId="{159D9149-F9AA-45E8-ABA6-7AC56A21C1F8}" srcOrd="0" destOrd="0" presId="urn:microsoft.com/office/officeart/2005/8/layout/list1"/>
+    <dgm:cxn modelId="{DED07964-2F3D-434B-8896-63F590AFB3D4}" srcId="{9BF01063-3BAB-4F4D-ADE8-387A89D22F7C}" destId="{4D5D3E7B-9F50-4387-AFBC-12316FB9B2E8}" srcOrd="0" destOrd="0" parTransId="{4B140464-D0A6-4FE6-BFF1-D92A0DD7F2F3}" sibTransId="{86595B4C-0A5C-4BD5-A6B3-FDB543D91B73}"/>
+    <dgm:cxn modelId="{E344A32A-539A-4B7E-ACFA-95DEF5620BA5}" srcId="{9BF01063-3BAB-4F4D-ADE8-387A89D22F7C}" destId="{3BFDB7AE-EA70-4208-99E4-6652F73E09AF}" srcOrd="1" destOrd="0" parTransId="{54A7580C-2761-4683-A631-30A94395D65A}" sibTransId="{9EFD2A57-70D2-4814-9534-F69C1AAF4BEC}"/>
+    <dgm:cxn modelId="{418BDB1E-B14B-41A7-9D8C-9C6887C8BC7F}" type="presOf" srcId="{4D5D3E7B-9F50-4387-AFBC-12316FB9B2E8}" destId="{15417C44-1630-41CC-AC5B-95723803EAAC}" srcOrd="1" destOrd="0" presId="urn:microsoft.com/office/officeart/2005/8/layout/list1"/>
     <dgm:cxn modelId="{5BEF8FBD-F7BC-444D-94D8-BB8E5A82AA43}" srcId="{9BF01063-3BAB-4F4D-ADE8-387A89D22F7C}" destId="{924689B8-E4E2-4802-BC6B-5B17E3AC8DDF}" srcOrd="2" destOrd="0" parTransId="{670CB166-EC54-4ECF-99EE-166A3C70F39E}" sibTransId="{A9E69FD6-91A0-40D3-96F5-93981AACB6C2}"/>
-    <dgm:cxn modelId="{4219486A-1AA6-4D7C-8DCD-F38DE310E10B}" type="presOf" srcId="{924689B8-E4E2-4802-BC6B-5B17E3AC8DDF}" destId="{E2ADE456-C079-4778-88D3-2ABF030BE345}" srcOrd="0" destOrd="0" presId="urn:microsoft.com/office/officeart/2005/8/layout/list1"/>
-    <dgm:cxn modelId="{A1CD1BE4-A834-4463-86D1-583A19E39584}" type="presOf" srcId="{9BF01063-3BAB-4F4D-ADE8-387A89D22F7C}" destId="{159D9149-F9AA-45E8-ABA6-7AC56A21C1F8}" srcOrd="0" destOrd="0" presId="urn:microsoft.com/office/officeart/2005/8/layout/list1"/>
-    <dgm:cxn modelId="{5D020E2A-D409-452B-ABB3-0EFE3A92652C}" type="presOf" srcId="{4C11F0D3-B1D8-41E5-B4ED-D28D5406ED7A}" destId="{C94856A0-C8B1-4244-B645-C266926A0AAB}" srcOrd="0" destOrd="0" presId="urn:microsoft.com/office/officeart/2005/8/layout/list1"/>
-    <dgm:cxn modelId="{FB20BC1E-834C-48C0-BD4E-04A5E0873844}" srcId="{4D5D3E7B-9F50-4387-AFBC-12316FB9B2E8}" destId="{4C11F0D3-B1D8-41E5-B4ED-D28D5406ED7A}" srcOrd="0" destOrd="0" parTransId="{C60CEBD2-531F-45D5-9CB2-1FBB715F4879}" sibTransId="{A1BF3405-CB09-4D5F-AAD9-E76A127FDC0C}"/>
-    <dgm:cxn modelId="{9738BE00-F026-4DB2-B7F4-EA1061D3A7FF}" type="presOf" srcId="{3BFDB7AE-EA70-4208-99E4-6652F73E09AF}" destId="{0F91977E-FD5F-4F09-AD28-B3380115D8C3}" srcOrd="0" destOrd="0" presId="urn:microsoft.com/office/officeart/2005/8/layout/list1"/>
-    <dgm:cxn modelId="{3B487C66-25D7-4E41-A5C2-F42C47637A7A}" type="presOf" srcId="{924689B8-E4E2-4802-BC6B-5B17E3AC8DDF}" destId="{E74DBF66-3AE1-4F14-A029-A5F2D0C36F78}" srcOrd="1" destOrd="0" presId="urn:microsoft.com/office/officeart/2005/8/layout/list1"/>
-    <dgm:cxn modelId="{26882D24-1258-440C-9950-32BA7E116E89}" type="presOf" srcId="{A43E1EE4-EA84-469B-B8E9-F87184BCD406}" destId="{FC04ED5C-48CE-49A3-98DF-4CA3B004B014}" srcOrd="0" destOrd="0" presId="urn:microsoft.com/office/officeart/2005/8/layout/list1"/>
-    <dgm:cxn modelId="{418BDB1E-B14B-41A7-9D8C-9C6887C8BC7F}" type="presOf" srcId="{4D5D3E7B-9F50-4387-AFBC-12316FB9B2E8}" destId="{15417C44-1630-41CC-AC5B-95723803EAAC}" srcOrd="1" destOrd="0" presId="urn:microsoft.com/office/officeart/2005/8/layout/list1"/>
-    <dgm:cxn modelId="{78C0F103-0BC0-46BC-BBBC-D58341736E99}" type="presOf" srcId="{5D56325C-A28C-4982-810F-F3CCECEC2E7D}" destId="{3C682040-43AF-4BE8-950E-E13003E6C6C7}" srcOrd="0" destOrd="0" presId="urn:microsoft.com/office/officeart/2005/8/layout/list1"/>
-    <dgm:cxn modelId="{E344A32A-539A-4B7E-ACFA-95DEF5620BA5}" srcId="{9BF01063-3BAB-4F4D-ADE8-387A89D22F7C}" destId="{3BFDB7AE-EA70-4208-99E4-6652F73E09AF}" srcOrd="1" destOrd="0" parTransId="{54A7580C-2761-4683-A631-30A94395D65A}" sibTransId="{9EFD2A57-70D2-4814-9534-F69C1AAF4BEC}"/>
-    <dgm:cxn modelId="{108E09CC-8703-4C9A-9F4C-239B367EEF86}" type="presOf" srcId="{3BFDB7AE-EA70-4208-99E4-6652F73E09AF}" destId="{501DDC76-9B9F-4697-8027-10EB121BC8A9}" srcOrd="1" destOrd="0" presId="urn:microsoft.com/office/officeart/2005/8/layout/list1"/>
-    <dgm:cxn modelId="{DED07964-2F3D-434B-8896-63F590AFB3D4}" srcId="{9BF01063-3BAB-4F4D-ADE8-387A89D22F7C}" destId="{4D5D3E7B-9F50-4387-AFBC-12316FB9B2E8}" srcOrd="0" destOrd="0" parTransId="{4B140464-D0A6-4FE6-BFF1-D92A0DD7F2F3}" sibTransId="{86595B4C-0A5C-4BD5-A6B3-FDB543D91B73}"/>
-    <dgm:cxn modelId="{2206174B-0967-4701-B7BB-572D079B3A22}" srcId="{3BFDB7AE-EA70-4208-99E4-6652F73E09AF}" destId="{5D56325C-A28C-4982-810F-F3CCECEC2E7D}" srcOrd="0" destOrd="0" parTransId="{5D99972C-BEA3-4759-BAAC-F0514ABC1FE1}" sibTransId="{ECCC7701-505F-42F0-B3C4-E9890A7BB77B}"/>
-    <dgm:cxn modelId="{D348ABC0-E7C5-475A-B6F1-B134560759E1}" type="presOf" srcId="{4D5D3E7B-9F50-4387-AFBC-12316FB9B2E8}" destId="{F126904A-86E7-4DEB-A715-98702053D074}" srcOrd="0" destOrd="0" presId="urn:microsoft.com/office/officeart/2005/8/layout/list1"/>
-    <dgm:cxn modelId="{C611089B-F9C4-4CB8-A2DC-4A6E2B8ECF02}" srcId="{924689B8-E4E2-4802-BC6B-5B17E3AC8DDF}" destId="{A43E1EE4-EA84-469B-B8E9-F87184BCD406}" srcOrd="0" destOrd="0" parTransId="{B5EEE765-35D4-4DF0-BFEC-78B63BE24D65}" sibTransId="{DFDEAEA3-03A5-44E8-ACA1-35C31669F285}"/>
     <dgm:cxn modelId="{BE00BBB3-1184-461B-97F7-D315BDD3D691}" type="presParOf" srcId="{159D9149-F9AA-45E8-ABA6-7AC56A21C1F8}" destId="{1063D51E-A931-450E-B6C9-26E16E6105C8}" srcOrd="0" destOrd="0" presId="urn:microsoft.com/office/officeart/2005/8/layout/list1"/>
     <dgm:cxn modelId="{79CF50A7-E302-42DE-B4FA-14593CA58892}" type="presParOf" srcId="{1063D51E-A931-450E-B6C9-26E16E6105C8}" destId="{F126904A-86E7-4DEB-A715-98702053D074}" srcOrd="0" destOrd="0" presId="urn:microsoft.com/office/officeart/2005/8/layout/list1"/>
     <dgm:cxn modelId="{3ABCB8CF-0045-4A73-BD75-619AA227F38A}" type="presParOf" srcId="{1063D51E-A931-450E-B6C9-26E16E6105C8}" destId="{15417C44-1630-41CC-AC5B-95723803EAAC}" srcOrd="1" destOrd="0" presId="urn:microsoft.com/office/officeart/2005/8/layout/list1"/>
@@ -18434,7 +18434,7 @@
               <a:pPr>
                 <a:defRPr/>
               </a:pPr>
-              <a:t>26/10/2013</a:t>
+              <a:t>27/10/2013</a:t>
             </a:fld>
             <a:endParaRPr lang="es-PE"/>
           </a:p>
@@ -18632,7 +18632,7 @@
               <a:pPr>
                 <a:defRPr/>
               </a:pPr>
-              <a:t>26/10/2013</a:t>
+              <a:t>27/10/2013</a:t>
             </a:fld>
             <a:endParaRPr lang="es-PE"/>
           </a:p>
@@ -18839,7 +18839,7 @@
               <a:pPr>
                 <a:defRPr/>
               </a:pPr>
-              <a:t>26/10/2013</a:t>
+              <a:t>27/10/2013</a:t>
             </a:fld>
             <a:endParaRPr lang="es-PE"/>
           </a:p>
@@ -20284,7 +20284,7 @@
               <a:pPr>
                 <a:defRPr/>
               </a:pPr>
-              <a:t>26/10/2013</a:t>
+              <a:t>27/10/2013</a:t>
             </a:fld>
             <a:endParaRPr lang="es-PE"/>
           </a:p>
@@ -22519,7 +22519,7 @@
               <a:pPr>
                 <a:defRPr/>
               </a:pPr>
-              <a:t>26/10/2013</a:t>
+              <a:t>27/10/2013</a:t>
             </a:fld>
             <a:endParaRPr lang="es-PE"/>
           </a:p>
@@ -24758,7 +24758,7 @@
               <a:pPr>
                 <a:defRPr/>
               </a:pPr>
-              <a:t>26/10/2013</a:t>
+              <a:t>27/10/2013</a:t>
             </a:fld>
             <a:endParaRPr lang="es-PE"/>
           </a:p>
@@ -26827,7 +26827,7 @@
               <a:pPr>
                 <a:defRPr/>
               </a:pPr>
-              <a:t>26/10/2013</a:t>
+              <a:t>27/10/2013</a:t>
             </a:fld>
             <a:endParaRPr lang="es-PE"/>
           </a:p>
@@ -28367,7 +28367,7 @@
               <a:pPr>
                 <a:defRPr/>
               </a:pPr>
-              <a:t>26/10/2013</a:t>
+              <a:t>27/10/2013</a:t>
             </a:fld>
             <a:endParaRPr lang="es-PE"/>
           </a:p>
@@ -28489,7 +28489,7 @@
               <a:pPr>
                 <a:defRPr/>
               </a:pPr>
-              <a:t>26/10/2013</a:t>
+              <a:t>27/10/2013</a:t>
             </a:fld>
             <a:endParaRPr lang="es-PE"/>
           </a:p>
@@ -28793,7 +28793,7 @@
               <a:pPr>
                 <a:defRPr/>
               </a:pPr>
-              <a:t>26/10/2013</a:t>
+              <a:t>27/10/2013</a:t>
             </a:fld>
             <a:endParaRPr lang="es-PE"/>
           </a:p>
@@ -29076,7 +29076,7 @@
               <a:pPr>
                 <a:defRPr/>
               </a:pPr>
-              <a:t>26/10/2013</a:t>
+              <a:t>27/10/2013</a:t>
             </a:fld>
             <a:endParaRPr lang="es-PE"/>
           </a:p>
@@ -29363,7 +29363,7 @@
               <a:pPr>
                 <a:defRPr/>
               </a:pPr>
-              <a:t>26/10/2013</a:t>
+              <a:t>27/10/2013</a:t>
             </a:fld>
             <a:endParaRPr lang="es-PE"/>
           </a:p>
@@ -40016,23 +40016,8 @@
                 </a:solidFill>
                 <a:cs typeface="Arial" charset="0"/>
               </a:rPr>
-              <a:t>Título </a:t>
-            </a:r>
-            <a:r>
-              <a:rPr lang="pt-BR" sz="2800" b="1" dirty="0" err="1">
-                <a:solidFill>
-                  <a:srgbClr val="17375E"/>
-                </a:solidFill>
-                <a:cs typeface="Arial" charset="0"/>
-              </a:rPr>
-              <a:t>Provisorio</a:t>
-            </a:r>
-            <a:endParaRPr lang="pt-BR" sz="2800" b="1" dirty="0">
-              <a:solidFill>
-                <a:srgbClr val="17375E"/>
-              </a:solidFill>
-              <a:cs typeface="Arial" charset="0"/>
-            </a:endParaRPr>
+              <a:t>Título Provisorio</a:t>
+            </a:r>
           </a:p>
         </p:txBody>
       </p:sp>
@@ -40086,20 +40071,12 @@
               </a:spcBef>
             </a:pPr>
             <a:r>
-              <a:rPr lang="pt-BR" sz="2000" b="1" dirty="0" err="1">
+              <a:rPr lang="pt-BR" sz="2000" b="1" dirty="0">
                 <a:solidFill>
                   <a:srgbClr val="000000"/>
                 </a:solidFill>
               </a:rPr>
-              <a:t>Palabras</a:t>
-            </a:r>
-            <a:r>
-              <a:rPr lang="pt-BR" sz="2000" b="1" dirty="0">
-                <a:solidFill>
-                  <a:srgbClr val="000000"/>
-                </a:solidFill>
-              </a:rPr>
-              <a:t>-claves</a:t>
+              <a:t>Palabras-claves</a:t>
             </a:r>
             <a:r>
               <a:rPr lang="pt-BR" sz="2000" dirty="0">
@@ -40110,12 +40087,12 @@
               <a:t>: </a:t>
             </a:r>
             <a:r>
-              <a:rPr lang="pt-BR" sz="2000" dirty="0" err="1">
+              <a:rPr lang="pt-BR" sz="2000" dirty="0" smtClean="0">
                 <a:solidFill>
                   <a:srgbClr val="000000"/>
                 </a:solidFill>
               </a:rPr>
-              <a:t>Implementación</a:t>
+              <a:t>Plataforma web. C2C. </a:t>
             </a:r>
             <a:r>
               <a:rPr lang="pt-BR" sz="2000" dirty="0">
@@ -40123,26 +40100,10 @@
                   <a:srgbClr val="000000"/>
                 </a:solidFill>
               </a:rPr>
-              <a:t>. Sistema web. </a:t>
-            </a:r>
-            <a:r>
-              <a:rPr lang="pt-BR" sz="2000" dirty="0" err="1">
-                <a:solidFill>
-                  <a:srgbClr val="000000"/>
-                </a:solidFill>
-              </a:rPr>
-              <a:t>Servicios</a:t>
-            </a:r>
-            <a:r>
-              <a:rPr lang="pt-BR" sz="2000" dirty="0">
-                <a:solidFill>
-                  <a:srgbClr val="000000"/>
-                </a:solidFill>
-              </a:rPr>
-              <a:t> </a:t>
-            </a:r>
-            <a:r>
-              <a:rPr lang="pt-BR" sz="2000" dirty="0" err="1" smtClean="0">
+              <a:t>Servicios </a:t>
+            </a:r>
+            <a:r>
+              <a:rPr lang="pt-BR" sz="2000" dirty="0" smtClean="0">
                 <a:solidFill>
                   <a:srgbClr val="000000"/>
                 </a:solidFill>
@@ -40150,7 +40111,7 @@
               <a:t>generales</a:t>
             </a:r>
             <a:r>
-              <a:rPr lang="pt-BR" sz="2000" dirty="0">
+              <a:rPr lang="pt-BR" sz="2000" dirty="0" smtClean="0">
                 <a:solidFill>
                   <a:srgbClr val="000000"/>
                 </a:solidFill>
@@ -40158,36 +40119,12 @@
               <a:t>. </a:t>
             </a:r>
             <a:r>
-              <a:rPr lang="pt-BR" sz="2000" dirty="0" err="1">
+              <a:rPr lang="pt-BR" sz="2000" dirty="0">
                 <a:solidFill>
                   <a:srgbClr val="000000"/>
                 </a:solidFill>
               </a:rPr>
-              <a:t>Trabajadores</a:t>
-            </a:r>
-            <a:r>
-              <a:rPr lang="pt-BR" sz="2000" dirty="0">
-                <a:solidFill>
-                  <a:srgbClr val="000000"/>
-                </a:solidFill>
-              </a:rPr>
-              <a:t> </a:t>
-            </a:r>
-            <a:r>
-              <a:rPr lang="pt-BR" sz="2000" dirty="0" err="1">
-                <a:solidFill>
-                  <a:srgbClr val="000000"/>
-                </a:solidFill>
-              </a:rPr>
-              <a:t>independientes</a:t>
-            </a:r>
-            <a:r>
-              <a:rPr lang="pt-BR" sz="2000" dirty="0">
-                <a:solidFill>
-                  <a:srgbClr val="000000"/>
-                </a:solidFill>
-              </a:rPr>
-              <a:t>. Modelo de negocio.</a:t>
+              <a:t>Modelo de negocio.</a:t>
             </a:r>
           </a:p>
         </p:txBody>
@@ -40247,7 +40184,23 @@
                   <a:srgbClr val="000000"/>
                 </a:solidFill>
               </a:rPr>
-              <a:t>ANÁLISIS, DISEÑO E IMPLEMENTACIÓN DE UN SISTEMA DE INFORMACIÓN PARA LA GESTIÓN DE ENTREGA DE SERVICIOS </a:t>
+              <a:t>ANÁLISIS, DISEÑO E IMPLEMENTACIÓN DE </a:t>
+            </a:r>
+            <a:r>
+              <a:rPr lang="es-PE" sz="2000" b="1" dirty="0" smtClean="0">
+                <a:solidFill>
+                  <a:srgbClr val="000000"/>
+                </a:solidFill>
+              </a:rPr>
+              <a:t>UNA PLATAFORMA WEB BASADA EN UN ESQUEMA C2C PARA </a:t>
+            </a:r>
+            <a:r>
+              <a:rPr lang="es-PE" sz="2000" b="1" dirty="0">
+                <a:solidFill>
+                  <a:srgbClr val="000000"/>
+                </a:solidFill>
+              </a:rPr>
+              <a:t>LA GESTIÓN DE ENTREGA DE SERVICIOS </a:t>
             </a:r>
             <a:r>
               <a:rPr lang="es-PE" sz="2000" b="1" dirty="0" smtClean="0">

</xml_diff>

<commit_message>
Documento - Falta RESUMEN
</commit_message>
<xml_diff>
--- a/Documentación/Presentaciones PPT/Tesis 2 - Mendez Presentación Parcial.pptx
+++ b/Documentación/Presentaciones PPT/Tesis 2 - Mendez Presentación Parcial.pptx
@@ -4427,7 +4427,11 @@
         <a:p>
           <a:r>
             <a:rPr lang="es-ES" sz="1600" dirty="0" smtClean="0"/>
-            <a:t>Implementación de la solución.</a:t>
+            <a:t>Elaboración de </a:t>
+          </a:r>
+          <a:r>
+            <a:rPr lang="es-ES" sz="1600" dirty="0" smtClean="0"/>
+            <a:t>la solución.</a:t>
           </a:r>
           <a:endParaRPr lang="es-PE" sz="1600" dirty="0"/>
         </a:p>
@@ -4852,22 +4856,22 @@
     </dgm:pt>
   </dgm:ptLst>
   <dgm:cxnLst>
+    <dgm:cxn modelId="{5BEF8FBD-F7BC-444D-94D8-BB8E5A82AA43}" srcId="{9BF01063-3BAB-4F4D-ADE8-387A89D22F7C}" destId="{924689B8-E4E2-4802-BC6B-5B17E3AC8DDF}" srcOrd="2" destOrd="0" parTransId="{670CB166-EC54-4ECF-99EE-166A3C70F39E}" sibTransId="{A9E69FD6-91A0-40D3-96F5-93981AACB6C2}"/>
+    <dgm:cxn modelId="{4219486A-1AA6-4D7C-8DCD-F38DE310E10B}" type="presOf" srcId="{924689B8-E4E2-4802-BC6B-5B17E3AC8DDF}" destId="{E2ADE456-C079-4778-88D3-2ABF030BE345}" srcOrd="0" destOrd="0" presId="urn:microsoft.com/office/officeart/2005/8/layout/list1"/>
+    <dgm:cxn modelId="{A1CD1BE4-A834-4463-86D1-583A19E39584}" type="presOf" srcId="{9BF01063-3BAB-4F4D-ADE8-387A89D22F7C}" destId="{159D9149-F9AA-45E8-ABA6-7AC56A21C1F8}" srcOrd="0" destOrd="0" presId="urn:microsoft.com/office/officeart/2005/8/layout/list1"/>
+    <dgm:cxn modelId="{5D020E2A-D409-452B-ABB3-0EFE3A92652C}" type="presOf" srcId="{4C11F0D3-B1D8-41E5-B4ED-D28D5406ED7A}" destId="{C94856A0-C8B1-4244-B645-C266926A0AAB}" srcOrd="0" destOrd="0" presId="urn:microsoft.com/office/officeart/2005/8/layout/list1"/>
+    <dgm:cxn modelId="{FB20BC1E-834C-48C0-BD4E-04A5E0873844}" srcId="{4D5D3E7B-9F50-4387-AFBC-12316FB9B2E8}" destId="{4C11F0D3-B1D8-41E5-B4ED-D28D5406ED7A}" srcOrd="0" destOrd="0" parTransId="{C60CEBD2-531F-45D5-9CB2-1FBB715F4879}" sibTransId="{A1BF3405-CB09-4D5F-AAD9-E76A127FDC0C}"/>
+    <dgm:cxn modelId="{9738BE00-F026-4DB2-B7F4-EA1061D3A7FF}" type="presOf" srcId="{3BFDB7AE-EA70-4208-99E4-6652F73E09AF}" destId="{0F91977E-FD5F-4F09-AD28-B3380115D8C3}" srcOrd="0" destOrd="0" presId="urn:microsoft.com/office/officeart/2005/8/layout/list1"/>
+    <dgm:cxn modelId="{3B487C66-25D7-4E41-A5C2-F42C47637A7A}" type="presOf" srcId="{924689B8-E4E2-4802-BC6B-5B17E3AC8DDF}" destId="{E74DBF66-3AE1-4F14-A029-A5F2D0C36F78}" srcOrd="1" destOrd="0" presId="urn:microsoft.com/office/officeart/2005/8/layout/list1"/>
+    <dgm:cxn modelId="{26882D24-1258-440C-9950-32BA7E116E89}" type="presOf" srcId="{A43E1EE4-EA84-469B-B8E9-F87184BCD406}" destId="{FC04ED5C-48CE-49A3-98DF-4CA3B004B014}" srcOrd="0" destOrd="0" presId="urn:microsoft.com/office/officeart/2005/8/layout/list1"/>
+    <dgm:cxn modelId="{418BDB1E-B14B-41A7-9D8C-9C6887C8BC7F}" type="presOf" srcId="{4D5D3E7B-9F50-4387-AFBC-12316FB9B2E8}" destId="{15417C44-1630-41CC-AC5B-95723803EAAC}" srcOrd="1" destOrd="0" presId="urn:microsoft.com/office/officeart/2005/8/layout/list1"/>
     <dgm:cxn modelId="{78C0F103-0BC0-46BC-BBBC-D58341736E99}" type="presOf" srcId="{5D56325C-A28C-4982-810F-F3CCECEC2E7D}" destId="{3C682040-43AF-4BE8-950E-E13003E6C6C7}" srcOrd="0" destOrd="0" presId="urn:microsoft.com/office/officeart/2005/8/layout/list1"/>
+    <dgm:cxn modelId="{E344A32A-539A-4B7E-ACFA-95DEF5620BA5}" srcId="{9BF01063-3BAB-4F4D-ADE8-387A89D22F7C}" destId="{3BFDB7AE-EA70-4208-99E4-6652F73E09AF}" srcOrd="1" destOrd="0" parTransId="{54A7580C-2761-4683-A631-30A94395D65A}" sibTransId="{9EFD2A57-70D2-4814-9534-F69C1AAF4BEC}"/>
+    <dgm:cxn modelId="{108E09CC-8703-4C9A-9F4C-239B367EEF86}" type="presOf" srcId="{3BFDB7AE-EA70-4208-99E4-6652F73E09AF}" destId="{501DDC76-9B9F-4697-8027-10EB121BC8A9}" srcOrd="1" destOrd="0" presId="urn:microsoft.com/office/officeart/2005/8/layout/list1"/>
+    <dgm:cxn modelId="{DED07964-2F3D-434B-8896-63F590AFB3D4}" srcId="{9BF01063-3BAB-4F4D-ADE8-387A89D22F7C}" destId="{4D5D3E7B-9F50-4387-AFBC-12316FB9B2E8}" srcOrd="0" destOrd="0" parTransId="{4B140464-D0A6-4FE6-BFF1-D92A0DD7F2F3}" sibTransId="{86595B4C-0A5C-4BD5-A6B3-FDB543D91B73}"/>
     <dgm:cxn modelId="{2206174B-0967-4701-B7BB-572D079B3A22}" srcId="{3BFDB7AE-EA70-4208-99E4-6652F73E09AF}" destId="{5D56325C-A28C-4982-810F-F3CCECEC2E7D}" srcOrd="0" destOrd="0" parTransId="{5D99972C-BEA3-4759-BAAC-F0514ABC1FE1}" sibTransId="{ECCC7701-505F-42F0-B3C4-E9890A7BB77B}"/>
+    <dgm:cxn modelId="{D348ABC0-E7C5-475A-B6F1-B134560759E1}" type="presOf" srcId="{4D5D3E7B-9F50-4387-AFBC-12316FB9B2E8}" destId="{F126904A-86E7-4DEB-A715-98702053D074}" srcOrd="0" destOrd="0" presId="urn:microsoft.com/office/officeart/2005/8/layout/list1"/>
     <dgm:cxn modelId="{C611089B-F9C4-4CB8-A2DC-4A6E2B8ECF02}" srcId="{924689B8-E4E2-4802-BC6B-5B17E3AC8DDF}" destId="{A43E1EE4-EA84-469B-B8E9-F87184BCD406}" srcOrd="0" destOrd="0" parTransId="{B5EEE765-35D4-4DF0-BFEC-78B63BE24D65}" sibTransId="{DFDEAEA3-03A5-44E8-ACA1-35C31669F285}"/>
-    <dgm:cxn modelId="{FB20BC1E-834C-48C0-BD4E-04A5E0873844}" srcId="{4D5D3E7B-9F50-4387-AFBC-12316FB9B2E8}" destId="{4C11F0D3-B1D8-41E5-B4ED-D28D5406ED7A}" srcOrd="0" destOrd="0" parTransId="{C60CEBD2-531F-45D5-9CB2-1FBB715F4879}" sibTransId="{A1BF3405-CB09-4D5F-AAD9-E76A127FDC0C}"/>
-    <dgm:cxn modelId="{4219486A-1AA6-4D7C-8DCD-F38DE310E10B}" type="presOf" srcId="{924689B8-E4E2-4802-BC6B-5B17E3AC8DDF}" destId="{E2ADE456-C079-4778-88D3-2ABF030BE345}" srcOrd="0" destOrd="0" presId="urn:microsoft.com/office/officeart/2005/8/layout/list1"/>
-    <dgm:cxn modelId="{26882D24-1258-440C-9950-32BA7E116E89}" type="presOf" srcId="{A43E1EE4-EA84-469B-B8E9-F87184BCD406}" destId="{FC04ED5C-48CE-49A3-98DF-4CA3B004B014}" srcOrd="0" destOrd="0" presId="urn:microsoft.com/office/officeart/2005/8/layout/list1"/>
-    <dgm:cxn modelId="{108E09CC-8703-4C9A-9F4C-239B367EEF86}" type="presOf" srcId="{3BFDB7AE-EA70-4208-99E4-6652F73E09AF}" destId="{501DDC76-9B9F-4697-8027-10EB121BC8A9}" srcOrd="1" destOrd="0" presId="urn:microsoft.com/office/officeart/2005/8/layout/list1"/>
-    <dgm:cxn modelId="{5D020E2A-D409-452B-ABB3-0EFE3A92652C}" type="presOf" srcId="{4C11F0D3-B1D8-41E5-B4ED-D28D5406ED7A}" destId="{C94856A0-C8B1-4244-B645-C266926A0AAB}" srcOrd="0" destOrd="0" presId="urn:microsoft.com/office/officeart/2005/8/layout/list1"/>
-    <dgm:cxn modelId="{9738BE00-F026-4DB2-B7F4-EA1061D3A7FF}" type="presOf" srcId="{3BFDB7AE-EA70-4208-99E4-6652F73E09AF}" destId="{0F91977E-FD5F-4F09-AD28-B3380115D8C3}" srcOrd="0" destOrd="0" presId="urn:microsoft.com/office/officeart/2005/8/layout/list1"/>
-    <dgm:cxn modelId="{D348ABC0-E7C5-475A-B6F1-B134560759E1}" type="presOf" srcId="{4D5D3E7B-9F50-4387-AFBC-12316FB9B2E8}" destId="{F126904A-86E7-4DEB-A715-98702053D074}" srcOrd="0" destOrd="0" presId="urn:microsoft.com/office/officeart/2005/8/layout/list1"/>
-    <dgm:cxn modelId="{3B487C66-25D7-4E41-A5C2-F42C47637A7A}" type="presOf" srcId="{924689B8-E4E2-4802-BC6B-5B17E3AC8DDF}" destId="{E74DBF66-3AE1-4F14-A029-A5F2D0C36F78}" srcOrd="1" destOrd="0" presId="urn:microsoft.com/office/officeart/2005/8/layout/list1"/>
-    <dgm:cxn modelId="{A1CD1BE4-A834-4463-86D1-583A19E39584}" type="presOf" srcId="{9BF01063-3BAB-4F4D-ADE8-387A89D22F7C}" destId="{159D9149-F9AA-45E8-ABA6-7AC56A21C1F8}" srcOrd="0" destOrd="0" presId="urn:microsoft.com/office/officeart/2005/8/layout/list1"/>
-    <dgm:cxn modelId="{DED07964-2F3D-434B-8896-63F590AFB3D4}" srcId="{9BF01063-3BAB-4F4D-ADE8-387A89D22F7C}" destId="{4D5D3E7B-9F50-4387-AFBC-12316FB9B2E8}" srcOrd="0" destOrd="0" parTransId="{4B140464-D0A6-4FE6-BFF1-D92A0DD7F2F3}" sibTransId="{86595B4C-0A5C-4BD5-A6B3-FDB543D91B73}"/>
-    <dgm:cxn modelId="{E344A32A-539A-4B7E-ACFA-95DEF5620BA5}" srcId="{9BF01063-3BAB-4F4D-ADE8-387A89D22F7C}" destId="{3BFDB7AE-EA70-4208-99E4-6652F73E09AF}" srcOrd="1" destOrd="0" parTransId="{54A7580C-2761-4683-A631-30A94395D65A}" sibTransId="{9EFD2A57-70D2-4814-9534-F69C1AAF4BEC}"/>
-    <dgm:cxn modelId="{418BDB1E-B14B-41A7-9D8C-9C6887C8BC7F}" type="presOf" srcId="{4D5D3E7B-9F50-4387-AFBC-12316FB9B2E8}" destId="{15417C44-1630-41CC-AC5B-95723803EAAC}" srcOrd="1" destOrd="0" presId="urn:microsoft.com/office/officeart/2005/8/layout/list1"/>
-    <dgm:cxn modelId="{5BEF8FBD-F7BC-444D-94D8-BB8E5A82AA43}" srcId="{9BF01063-3BAB-4F4D-ADE8-387A89D22F7C}" destId="{924689B8-E4E2-4802-BC6B-5B17E3AC8DDF}" srcOrd="2" destOrd="0" parTransId="{670CB166-EC54-4ECF-99EE-166A3C70F39E}" sibTransId="{A9E69FD6-91A0-40D3-96F5-93981AACB6C2}"/>
     <dgm:cxn modelId="{BE00BBB3-1184-461B-97F7-D315BDD3D691}" type="presParOf" srcId="{159D9149-F9AA-45E8-ABA6-7AC56A21C1F8}" destId="{1063D51E-A931-450E-B6C9-26E16E6105C8}" srcOrd="0" destOrd="0" presId="urn:microsoft.com/office/officeart/2005/8/layout/list1"/>
     <dgm:cxn modelId="{79CF50A7-E302-42DE-B4FA-14593CA58892}" type="presParOf" srcId="{1063D51E-A931-450E-B6C9-26E16E6105C8}" destId="{F126904A-86E7-4DEB-A715-98702053D074}" srcOrd="0" destOrd="0" presId="urn:microsoft.com/office/officeart/2005/8/layout/list1"/>
     <dgm:cxn modelId="{3ABCB8CF-0045-4A73-BD75-619AA227F38A}" type="presParOf" srcId="{1063D51E-A931-450E-B6C9-26E16E6105C8}" destId="{15417C44-1630-41CC-AC5B-95723803EAAC}" srcOrd="1" destOrd="0" presId="urn:microsoft.com/office/officeart/2005/8/layout/list1"/>
@@ -4956,15 +4960,7 @@
         <a:p>
           <a:r>
             <a:rPr lang="es-ES" sz="1400" dirty="0" smtClean="0"/>
-            <a:t>Caso </a:t>
-          </a:r>
-          <a:r>
-            <a:rPr lang="es-ES" sz="1400" dirty="0" smtClean="0"/>
-            <a:t>de </a:t>
-          </a:r>
-          <a:r>
-            <a:rPr lang="es-ES" sz="1400" dirty="0" smtClean="0"/>
-            <a:t>negocio documentado.</a:t>
+            <a:t>Caso de negocio documentado.</a:t>
           </a:r>
           <a:endParaRPr lang="es-PE" sz="1400" dirty="0"/>
         </a:p>
@@ -5120,11 +5116,7 @@
         <a:p>
           <a:r>
             <a:rPr lang="es-PE" sz="1400" dirty="0" smtClean="0"/>
-            <a:t>Modelado de los procesos </a:t>
-          </a:r>
-          <a:r>
-            <a:rPr lang="es-PE" sz="1400" dirty="0" smtClean="0"/>
-            <a:t>de negocio mencionados en el objetivo específico 3.</a:t>
+            <a:t>Modelado de los procesos de negocio mencionados en el objetivo específico 3.</a:t>
           </a:r>
           <a:endParaRPr lang="es-PE" sz="1400" dirty="0"/>
         </a:p>
@@ -5198,11 +5190,7 @@
         <a:p>
           <a:r>
             <a:rPr lang="es-PE" sz="1400" dirty="0" smtClean="0"/>
-            <a:t>Pseudocódigo y diagrama de flujo del </a:t>
-          </a:r>
-          <a:r>
-            <a:rPr lang="es-PE" sz="1400" dirty="0" smtClean="0"/>
-            <a:t>algoritmo Tabú para la asignación de los mejores proveedores al cliente, dados los factores mencionados en el objetivo específico 4.</a:t>
+            <a:t>Pseudocódigo y diagrama de flujo del algoritmo Tabú para la asignación de los mejores proveedores al cliente, dados los factores mencionados en el objetivo específico 4.</a:t>
           </a:r>
           <a:endParaRPr lang="es-PE" sz="1400" dirty="0"/>
         </a:p>
@@ -7047,7 +7035,11 @@
           </a:pPr>
           <a:r>
             <a:rPr lang="es-ES" sz="1600" kern="1200" dirty="0" smtClean="0"/>
-            <a:t>Implementación de la solución.</a:t>
+            <a:t>Elaboración de </a:t>
+          </a:r>
+          <a:r>
+            <a:rPr lang="es-ES" sz="1600" kern="1200" dirty="0" smtClean="0"/>
+            <a:t>la solución.</a:t>
           </a:r>
           <a:endParaRPr lang="es-PE" sz="1600" kern="1200" dirty="0"/>
         </a:p>
@@ -7216,15 +7208,7 @@
           </a:pPr>
           <a:r>
             <a:rPr lang="es-ES" sz="1400" kern="1200" dirty="0" smtClean="0"/>
-            <a:t>Caso </a:t>
-          </a:r>
-          <a:r>
-            <a:rPr lang="es-ES" sz="1400" kern="1200" dirty="0" smtClean="0"/>
-            <a:t>de </a:t>
-          </a:r>
-          <a:r>
-            <a:rPr lang="es-ES" sz="1400" kern="1200" dirty="0" smtClean="0"/>
-            <a:t>negocio documentado.</a:t>
+            <a:t>Caso de negocio documentado.</a:t>
           </a:r>
           <a:endParaRPr lang="es-PE" sz="1400" kern="1200" dirty="0"/>
         </a:p>
@@ -7548,11 +7532,7 @@
           </a:pPr>
           <a:r>
             <a:rPr lang="es-PE" sz="1400" kern="1200" dirty="0" smtClean="0"/>
-            <a:t>Modelado de los procesos </a:t>
-          </a:r>
-          <a:r>
-            <a:rPr lang="es-PE" sz="1400" kern="1200" dirty="0" smtClean="0"/>
-            <a:t>de negocio mencionados en el objetivo específico 3.</a:t>
+            <a:t>Modelado de los procesos de negocio mencionados en el objetivo específico 3.</a:t>
           </a:r>
           <a:endParaRPr lang="es-PE" sz="1400" kern="1200" dirty="0"/>
         </a:p>
@@ -7710,11 +7690,7 @@
           </a:pPr>
           <a:r>
             <a:rPr lang="es-PE" sz="1400" kern="1200" dirty="0" smtClean="0"/>
-            <a:t>Pseudocódigo y diagrama de flujo del </a:t>
-          </a:r>
-          <a:r>
-            <a:rPr lang="es-PE" sz="1400" kern="1200" dirty="0" smtClean="0"/>
-            <a:t>algoritmo Tabú para la asignación de los mejores proveedores al cliente, dados los factores mencionados en el objetivo específico 4.</a:t>
+            <a:t>Pseudocódigo y diagrama de flujo del algoritmo Tabú para la asignación de los mejores proveedores al cliente, dados los factores mencionados en el objetivo específico 4.</a:t>
           </a:r>
           <a:endParaRPr lang="es-PE" sz="1400" kern="1200" dirty="0"/>
         </a:p>
@@ -15860,7 +15836,7 @@
               <a:pPr>
                 <a:defRPr/>
               </a:pPr>
-              <a:t>31/10/2013</a:t>
+              <a:t>02/11/2013</a:t>
             </a:fld>
             <a:endParaRPr lang="es-PE"/>
           </a:p>
@@ -16058,7 +16034,7 @@
               <a:pPr>
                 <a:defRPr/>
               </a:pPr>
-              <a:t>31/10/2013</a:t>
+              <a:t>02/11/2013</a:t>
             </a:fld>
             <a:endParaRPr lang="es-PE"/>
           </a:p>
@@ -16265,7 +16241,7 @@
               <a:pPr>
                 <a:defRPr/>
               </a:pPr>
-              <a:t>31/10/2013</a:t>
+              <a:t>02/11/2013</a:t>
             </a:fld>
             <a:endParaRPr lang="es-PE"/>
           </a:p>
@@ -17710,7 +17686,7 @@
               <a:pPr>
                 <a:defRPr/>
               </a:pPr>
-              <a:t>31/10/2013</a:t>
+              <a:t>02/11/2013</a:t>
             </a:fld>
             <a:endParaRPr lang="es-PE"/>
           </a:p>
@@ -19945,7 +19921,7 @@
               <a:pPr>
                 <a:defRPr/>
               </a:pPr>
-              <a:t>31/10/2013</a:t>
+              <a:t>02/11/2013</a:t>
             </a:fld>
             <a:endParaRPr lang="es-PE"/>
           </a:p>
@@ -21143,7 +21119,7 @@
               <a:pPr>
                 <a:defRPr/>
               </a:pPr>
-              <a:t>31/10/2013</a:t>
+              <a:t>02/11/2013</a:t>
             </a:fld>
             <a:endParaRPr lang="es-PE"/>
           </a:p>
@@ -21592,7 +21568,7 @@
               <a:pPr>
                 <a:defRPr/>
               </a:pPr>
-              <a:t>31/10/2013</a:t>
+              <a:t>02/11/2013</a:t>
             </a:fld>
             <a:endParaRPr lang="es-PE"/>
           </a:p>
@@ -21737,7 +21713,7 @@
               <a:pPr>
                 <a:defRPr/>
               </a:pPr>
-              <a:t>31/10/2013</a:t>
+              <a:t>02/11/2013</a:t>
             </a:fld>
             <a:endParaRPr lang="es-PE"/>
           </a:p>
@@ -21859,7 +21835,7 @@
               <a:pPr>
                 <a:defRPr/>
               </a:pPr>
-              <a:t>31/10/2013</a:t>
+              <a:t>02/11/2013</a:t>
             </a:fld>
             <a:endParaRPr lang="es-PE"/>
           </a:p>
@@ -22163,7 +22139,7 @@
               <a:pPr>
                 <a:defRPr/>
               </a:pPr>
-              <a:t>31/10/2013</a:t>
+              <a:t>02/11/2013</a:t>
             </a:fld>
             <a:endParaRPr lang="es-PE"/>
           </a:p>
@@ -22446,7 +22422,7 @@
               <a:pPr>
                 <a:defRPr/>
               </a:pPr>
-              <a:t>31/10/2013</a:t>
+              <a:t>02/11/2013</a:t>
             </a:fld>
             <a:endParaRPr lang="es-PE"/>
           </a:p>
@@ -22733,7 +22709,7 @@
               <a:pPr>
                 <a:defRPr/>
               </a:pPr>
-              <a:t>31/10/2013</a:t>
+              <a:t>02/11/2013</a:t>
             </a:fld>
             <a:endParaRPr lang="es-PE"/>
           </a:p>
@@ -30372,7 +30348,7 @@
           <p:nvPr>
             <p:extLst>
               <p:ext uri="{D42A27DB-BD31-4B8C-83A1-F6EECF244321}">
-                <p14:modId xmlns:p14="http://schemas.microsoft.com/office/powerpoint/2010/main" val="353984633"/>
+                <p14:modId xmlns:p14="http://schemas.microsoft.com/office/powerpoint/2010/main" val="3124728933"/>
               </p:ext>
             </p:extLst>
           </p:nvPr>

</xml_diff>

<commit_message>
Documento revisado por Aguilera EditarMiInformacion
</commit_message>
<xml_diff>
--- a/Documentación/Presentaciones PPT/Tesis 2 - Mendez Presentación Parcial.pptx
+++ b/Documentación/Presentaciones PPT/Tesis 2 - Mendez Presentación Parcial.pptx
@@ -4427,11 +4427,7 @@
         <a:p>
           <a:r>
             <a:rPr lang="es-ES" sz="1600" dirty="0" smtClean="0"/>
-            <a:t>Elaboración de </a:t>
-          </a:r>
-          <a:r>
-            <a:rPr lang="es-ES" sz="1600" dirty="0" smtClean="0"/>
-            <a:t>la solución.</a:t>
+            <a:t>Elaboración de la solución.</a:t>
           </a:r>
           <a:endParaRPr lang="es-PE" sz="1600" dirty="0"/>
         </a:p>
@@ -4856,22 +4852,22 @@
     </dgm:pt>
   </dgm:ptLst>
   <dgm:cxnLst>
+    <dgm:cxn modelId="{78C0F103-0BC0-46BC-BBBC-D58341736E99}" type="presOf" srcId="{5D56325C-A28C-4982-810F-F3CCECEC2E7D}" destId="{3C682040-43AF-4BE8-950E-E13003E6C6C7}" srcOrd="0" destOrd="0" presId="urn:microsoft.com/office/officeart/2005/8/layout/list1"/>
+    <dgm:cxn modelId="{2206174B-0967-4701-B7BB-572D079B3A22}" srcId="{3BFDB7AE-EA70-4208-99E4-6652F73E09AF}" destId="{5D56325C-A28C-4982-810F-F3CCECEC2E7D}" srcOrd="0" destOrd="0" parTransId="{5D99972C-BEA3-4759-BAAC-F0514ABC1FE1}" sibTransId="{ECCC7701-505F-42F0-B3C4-E9890A7BB77B}"/>
+    <dgm:cxn modelId="{C611089B-F9C4-4CB8-A2DC-4A6E2B8ECF02}" srcId="{924689B8-E4E2-4802-BC6B-5B17E3AC8DDF}" destId="{A43E1EE4-EA84-469B-B8E9-F87184BCD406}" srcOrd="0" destOrd="0" parTransId="{B5EEE765-35D4-4DF0-BFEC-78B63BE24D65}" sibTransId="{DFDEAEA3-03A5-44E8-ACA1-35C31669F285}"/>
+    <dgm:cxn modelId="{FB20BC1E-834C-48C0-BD4E-04A5E0873844}" srcId="{4D5D3E7B-9F50-4387-AFBC-12316FB9B2E8}" destId="{4C11F0D3-B1D8-41E5-B4ED-D28D5406ED7A}" srcOrd="0" destOrd="0" parTransId="{C60CEBD2-531F-45D5-9CB2-1FBB715F4879}" sibTransId="{A1BF3405-CB09-4D5F-AAD9-E76A127FDC0C}"/>
+    <dgm:cxn modelId="{4219486A-1AA6-4D7C-8DCD-F38DE310E10B}" type="presOf" srcId="{924689B8-E4E2-4802-BC6B-5B17E3AC8DDF}" destId="{E2ADE456-C079-4778-88D3-2ABF030BE345}" srcOrd="0" destOrd="0" presId="urn:microsoft.com/office/officeart/2005/8/layout/list1"/>
+    <dgm:cxn modelId="{26882D24-1258-440C-9950-32BA7E116E89}" type="presOf" srcId="{A43E1EE4-EA84-469B-B8E9-F87184BCD406}" destId="{FC04ED5C-48CE-49A3-98DF-4CA3B004B014}" srcOrd="0" destOrd="0" presId="urn:microsoft.com/office/officeart/2005/8/layout/list1"/>
+    <dgm:cxn modelId="{108E09CC-8703-4C9A-9F4C-239B367EEF86}" type="presOf" srcId="{3BFDB7AE-EA70-4208-99E4-6652F73E09AF}" destId="{501DDC76-9B9F-4697-8027-10EB121BC8A9}" srcOrd="1" destOrd="0" presId="urn:microsoft.com/office/officeart/2005/8/layout/list1"/>
+    <dgm:cxn modelId="{5D020E2A-D409-452B-ABB3-0EFE3A92652C}" type="presOf" srcId="{4C11F0D3-B1D8-41E5-B4ED-D28D5406ED7A}" destId="{C94856A0-C8B1-4244-B645-C266926A0AAB}" srcOrd="0" destOrd="0" presId="urn:microsoft.com/office/officeart/2005/8/layout/list1"/>
+    <dgm:cxn modelId="{9738BE00-F026-4DB2-B7F4-EA1061D3A7FF}" type="presOf" srcId="{3BFDB7AE-EA70-4208-99E4-6652F73E09AF}" destId="{0F91977E-FD5F-4F09-AD28-B3380115D8C3}" srcOrd="0" destOrd="0" presId="urn:microsoft.com/office/officeart/2005/8/layout/list1"/>
+    <dgm:cxn modelId="{D348ABC0-E7C5-475A-B6F1-B134560759E1}" type="presOf" srcId="{4D5D3E7B-9F50-4387-AFBC-12316FB9B2E8}" destId="{F126904A-86E7-4DEB-A715-98702053D074}" srcOrd="0" destOrd="0" presId="urn:microsoft.com/office/officeart/2005/8/layout/list1"/>
+    <dgm:cxn modelId="{3B487C66-25D7-4E41-A5C2-F42C47637A7A}" type="presOf" srcId="{924689B8-E4E2-4802-BC6B-5B17E3AC8DDF}" destId="{E74DBF66-3AE1-4F14-A029-A5F2D0C36F78}" srcOrd="1" destOrd="0" presId="urn:microsoft.com/office/officeart/2005/8/layout/list1"/>
+    <dgm:cxn modelId="{A1CD1BE4-A834-4463-86D1-583A19E39584}" type="presOf" srcId="{9BF01063-3BAB-4F4D-ADE8-387A89D22F7C}" destId="{159D9149-F9AA-45E8-ABA6-7AC56A21C1F8}" srcOrd="0" destOrd="0" presId="urn:microsoft.com/office/officeart/2005/8/layout/list1"/>
+    <dgm:cxn modelId="{DED07964-2F3D-434B-8896-63F590AFB3D4}" srcId="{9BF01063-3BAB-4F4D-ADE8-387A89D22F7C}" destId="{4D5D3E7B-9F50-4387-AFBC-12316FB9B2E8}" srcOrd="0" destOrd="0" parTransId="{4B140464-D0A6-4FE6-BFF1-D92A0DD7F2F3}" sibTransId="{86595B4C-0A5C-4BD5-A6B3-FDB543D91B73}"/>
+    <dgm:cxn modelId="{E344A32A-539A-4B7E-ACFA-95DEF5620BA5}" srcId="{9BF01063-3BAB-4F4D-ADE8-387A89D22F7C}" destId="{3BFDB7AE-EA70-4208-99E4-6652F73E09AF}" srcOrd="1" destOrd="0" parTransId="{54A7580C-2761-4683-A631-30A94395D65A}" sibTransId="{9EFD2A57-70D2-4814-9534-F69C1AAF4BEC}"/>
+    <dgm:cxn modelId="{418BDB1E-B14B-41A7-9D8C-9C6887C8BC7F}" type="presOf" srcId="{4D5D3E7B-9F50-4387-AFBC-12316FB9B2E8}" destId="{15417C44-1630-41CC-AC5B-95723803EAAC}" srcOrd="1" destOrd="0" presId="urn:microsoft.com/office/officeart/2005/8/layout/list1"/>
     <dgm:cxn modelId="{5BEF8FBD-F7BC-444D-94D8-BB8E5A82AA43}" srcId="{9BF01063-3BAB-4F4D-ADE8-387A89D22F7C}" destId="{924689B8-E4E2-4802-BC6B-5B17E3AC8DDF}" srcOrd="2" destOrd="0" parTransId="{670CB166-EC54-4ECF-99EE-166A3C70F39E}" sibTransId="{A9E69FD6-91A0-40D3-96F5-93981AACB6C2}"/>
-    <dgm:cxn modelId="{4219486A-1AA6-4D7C-8DCD-F38DE310E10B}" type="presOf" srcId="{924689B8-E4E2-4802-BC6B-5B17E3AC8DDF}" destId="{E2ADE456-C079-4778-88D3-2ABF030BE345}" srcOrd="0" destOrd="0" presId="urn:microsoft.com/office/officeart/2005/8/layout/list1"/>
-    <dgm:cxn modelId="{A1CD1BE4-A834-4463-86D1-583A19E39584}" type="presOf" srcId="{9BF01063-3BAB-4F4D-ADE8-387A89D22F7C}" destId="{159D9149-F9AA-45E8-ABA6-7AC56A21C1F8}" srcOrd="0" destOrd="0" presId="urn:microsoft.com/office/officeart/2005/8/layout/list1"/>
-    <dgm:cxn modelId="{5D020E2A-D409-452B-ABB3-0EFE3A92652C}" type="presOf" srcId="{4C11F0D3-B1D8-41E5-B4ED-D28D5406ED7A}" destId="{C94856A0-C8B1-4244-B645-C266926A0AAB}" srcOrd="0" destOrd="0" presId="urn:microsoft.com/office/officeart/2005/8/layout/list1"/>
-    <dgm:cxn modelId="{FB20BC1E-834C-48C0-BD4E-04A5E0873844}" srcId="{4D5D3E7B-9F50-4387-AFBC-12316FB9B2E8}" destId="{4C11F0D3-B1D8-41E5-B4ED-D28D5406ED7A}" srcOrd="0" destOrd="0" parTransId="{C60CEBD2-531F-45D5-9CB2-1FBB715F4879}" sibTransId="{A1BF3405-CB09-4D5F-AAD9-E76A127FDC0C}"/>
-    <dgm:cxn modelId="{9738BE00-F026-4DB2-B7F4-EA1061D3A7FF}" type="presOf" srcId="{3BFDB7AE-EA70-4208-99E4-6652F73E09AF}" destId="{0F91977E-FD5F-4F09-AD28-B3380115D8C3}" srcOrd="0" destOrd="0" presId="urn:microsoft.com/office/officeart/2005/8/layout/list1"/>
-    <dgm:cxn modelId="{3B487C66-25D7-4E41-A5C2-F42C47637A7A}" type="presOf" srcId="{924689B8-E4E2-4802-BC6B-5B17E3AC8DDF}" destId="{E74DBF66-3AE1-4F14-A029-A5F2D0C36F78}" srcOrd="1" destOrd="0" presId="urn:microsoft.com/office/officeart/2005/8/layout/list1"/>
-    <dgm:cxn modelId="{26882D24-1258-440C-9950-32BA7E116E89}" type="presOf" srcId="{A43E1EE4-EA84-469B-B8E9-F87184BCD406}" destId="{FC04ED5C-48CE-49A3-98DF-4CA3B004B014}" srcOrd="0" destOrd="0" presId="urn:microsoft.com/office/officeart/2005/8/layout/list1"/>
-    <dgm:cxn modelId="{418BDB1E-B14B-41A7-9D8C-9C6887C8BC7F}" type="presOf" srcId="{4D5D3E7B-9F50-4387-AFBC-12316FB9B2E8}" destId="{15417C44-1630-41CC-AC5B-95723803EAAC}" srcOrd="1" destOrd="0" presId="urn:microsoft.com/office/officeart/2005/8/layout/list1"/>
-    <dgm:cxn modelId="{78C0F103-0BC0-46BC-BBBC-D58341736E99}" type="presOf" srcId="{5D56325C-A28C-4982-810F-F3CCECEC2E7D}" destId="{3C682040-43AF-4BE8-950E-E13003E6C6C7}" srcOrd="0" destOrd="0" presId="urn:microsoft.com/office/officeart/2005/8/layout/list1"/>
-    <dgm:cxn modelId="{E344A32A-539A-4B7E-ACFA-95DEF5620BA5}" srcId="{9BF01063-3BAB-4F4D-ADE8-387A89D22F7C}" destId="{3BFDB7AE-EA70-4208-99E4-6652F73E09AF}" srcOrd="1" destOrd="0" parTransId="{54A7580C-2761-4683-A631-30A94395D65A}" sibTransId="{9EFD2A57-70D2-4814-9534-F69C1AAF4BEC}"/>
-    <dgm:cxn modelId="{108E09CC-8703-4C9A-9F4C-239B367EEF86}" type="presOf" srcId="{3BFDB7AE-EA70-4208-99E4-6652F73E09AF}" destId="{501DDC76-9B9F-4697-8027-10EB121BC8A9}" srcOrd="1" destOrd="0" presId="urn:microsoft.com/office/officeart/2005/8/layout/list1"/>
-    <dgm:cxn modelId="{DED07964-2F3D-434B-8896-63F590AFB3D4}" srcId="{9BF01063-3BAB-4F4D-ADE8-387A89D22F7C}" destId="{4D5D3E7B-9F50-4387-AFBC-12316FB9B2E8}" srcOrd="0" destOrd="0" parTransId="{4B140464-D0A6-4FE6-BFF1-D92A0DD7F2F3}" sibTransId="{86595B4C-0A5C-4BD5-A6B3-FDB543D91B73}"/>
-    <dgm:cxn modelId="{2206174B-0967-4701-B7BB-572D079B3A22}" srcId="{3BFDB7AE-EA70-4208-99E4-6652F73E09AF}" destId="{5D56325C-A28C-4982-810F-F3CCECEC2E7D}" srcOrd="0" destOrd="0" parTransId="{5D99972C-BEA3-4759-BAAC-F0514ABC1FE1}" sibTransId="{ECCC7701-505F-42F0-B3C4-E9890A7BB77B}"/>
-    <dgm:cxn modelId="{D348ABC0-E7C5-475A-B6F1-B134560759E1}" type="presOf" srcId="{4D5D3E7B-9F50-4387-AFBC-12316FB9B2E8}" destId="{F126904A-86E7-4DEB-A715-98702053D074}" srcOrd="0" destOrd="0" presId="urn:microsoft.com/office/officeart/2005/8/layout/list1"/>
-    <dgm:cxn modelId="{C611089B-F9C4-4CB8-A2DC-4A6E2B8ECF02}" srcId="{924689B8-E4E2-4802-BC6B-5B17E3AC8DDF}" destId="{A43E1EE4-EA84-469B-B8E9-F87184BCD406}" srcOrd="0" destOrd="0" parTransId="{B5EEE765-35D4-4DF0-BFEC-78B63BE24D65}" sibTransId="{DFDEAEA3-03A5-44E8-ACA1-35C31669F285}"/>
     <dgm:cxn modelId="{BE00BBB3-1184-461B-97F7-D315BDD3D691}" type="presParOf" srcId="{159D9149-F9AA-45E8-ABA6-7AC56A21C1F8}" destId="{1063D51E-A931-450E-B6C9-26E16E6105C8}" srcOrd="0" destOrd="0" presId="urn:microsoft.com/office/officeart/2005/8/layout/list1"/>
     <dgm:cxn modelId="{79CF50A7-E302-42DE-B4FA-14593CA58892}" type="presParOf" srcId="{1063D51E-A931-450E-B6C9-26E16E6105C8}" destId="{F126904A-86E7-4DEB-A715-98702053D074}" srcOrd="0" destOrd="0" presId="urn:microsoft.com/office/officeart/2005/8/layout/list1"/>
     <dgm:cxn modelId="{3ABCB8CF-0045-4A73-BD75-619AA227F38A}" type="presParOf" srcId="{1063D51E-A931-450E-B6C9-26E16E6105C8}" destId="{15417C44-1630-41CC-AC5B-95723803EAAC}" srcOrd="1" destOrd="0" presId="urn:microsoft.com/office/officeart/2005/8/layout/list1"/>
@@ -7035,11 +7031,7 @@
           </a:pPr>
           <a:r>
             <a:rPr lang="es-ES" sz="1600" kern="1200" dirty="0" smtClean="0"/>
-            <a:t>Elaboración de </a:t>
-          </a:r>
-          <a:r>
-            <a:rPr lang="es-ES" sz="1600" kern="1200" dirty="0" smtClean="0"/>
-            <a:t>la solución.</a:t>
+            <a:t>Elaboración de la solución.</a:t>
           </a:r>
           <a:endParaRPr lang="es-PE" sz="1600" kern="1200" dirty="0"/>
         </a:p>
@@ -15836,7 +15828,7 @@
               <a:pPr>
                 <a:defRPr/>
               </a:pPr>
-              <a:t>02/11/2013</a:t>
+              <a:t>08/11/2013</a:t>
             </a:fld>
             <a:endParaRPr lang="es-PE"/>
           </a:p>
@@ -16034,7 +16026,7 @@
               <a:pPr>
                 <a:defRPr/>
               </a:pPr>
-              <a:t>02/11/2013</a:t>
+              <a:t>08/11/2013</a:t>
             </a:fld>
             <a:endParaRPr lang="es-PE"/>
           </a:p>
@@ -16241,7 +16233,7 @@
               <a:pPr>
                 <a:defRPr/>
               </a:pPr>
-              <a:t>02/11/2013</a:t>
+              <a:t>08/11/2013</a:t>
             </a:fld>
             <a:endParaRPr lang="es-PE"/>
           </a:p>
@@ -17686,7 +17678,7 @@
               <a:pPr>
                 <a:defRPr/>
               </a:pPr>
-              <a:t>02/11/2013</a:t>
+              <a:t>08/11/2013</a:t>
             </a:fld>
             <a:endParaRPr lang="es-PE"/>
           </a:p>
@@ -19921,7 +19913,7 @@
               <a:pPr>
                 <a:defRPr/>
               </a:pPr>
-              <a:t>02/11/2013</a:t>
+              <a:t>08/11/2013</a:t>
             </a:fld>
             <a:endParaRPr lang="es-PE"/>
           </a:p>
@@ -21119,7 +21111,7 @@
               <a:pPr>
                 <a:defRPr/>
               </a:pPr>
-              <a:t>02/11/2013</a:t>
+              <a:t>08/11/2013</a:t>
             </a:fld>
             <a:endParaRPr lang="es-PE"/>
           </a:p>
@@ -21568,7 +21560,7 @@
               <a:pPr>
                 <a:defRPr/>
               </a:pPr>
-              <a:t>02/11/2013</a:t>
+              <a:t>08/11/2013</a:t>
             </a:fld>
             <a:endParaRPr lang="es-PE"/>
           </a:p>
@@ -21713,7 +21705,7 @@
               <a:pPr>
                 <a:defRPr/>
               </a:pPr>
-              <a:t>02/11/2013</a:t>
+              <a:t>08/11/2013</a:t>
             </a:fld>
             <a:endParaRPr lang="es-PE"/>
           </a:p>
@@ -21835,7 +21827,7 @@
               <a:pPr>
                 <a:defRPr/>
               </a:pPr>
-              <a:t>02/11/2013</a:t>
+              <a:t>08/11/2013</a:t>
             </a:fld>
             <a:endParaRPr lang="es-PE"/>
           </a:p>
@@ -22139,7 +22131,7 @@
               <a:pPr>
                 <a:defRPr/>
               </a:pPr>
-              <a:t>02/11/2013</a:t>
+              <a:t>08/11/2013</a:t>
             </a:fld>
             <a:endParaRPr lang="es-PE"/>
           </a:p>
@@ -22422,7 +22414,7 @@
               <a:pPr>
                 <a:defRPr/>
               </a:pPr>
-              <a:t>02/11/2013</a:t>
+              <a:t>08/11/2013</a:t>
             </a:fld>
             <a:endParaRPr lang="es-PE"/>
           </a:p>
@@ -22709,7 +22701,7 @@
               <a:pPr>
                 <a:defRPr/>
               </a:pPr>
-              <a:t>02/11/2013</a:t>
+              <a:t>08/11/2013</a:t>
             </a:fld>
             <a:endParaRPr lang="es-PE"/>
           </a:p>
@@ -29798,7 +29790,34 @@
                 </a:solidFill>
                 <a:latin typeface="Arial"/>
               </a:rPr>
-              <a:t>en un esquema de comercio electrónico que permita conectar clientes, proveedores de servicios, y tiendas y cadenas de ferreterías.</a:t>
+              <a:t>en un esquema de comercio electrónico </a:t>
+            </a:r>
+            <a:r>
+              <a:rPr lang="es-MX" sz="2000" kern="0" dirty="0" smtClean="0">
+                <a:solidFill>
+                  <a:srgbClr val="000000"/>
+                </a:solidFill>
+                <a:latin typeface="Arial"/>
+              </a:rPr>
+              <a:t>C2C </a:t>
+            </a:r>
+            <a:r>
+              <a:rPr lang="es-MX" sz="2000" kern="0" dirty="0" smtClean="0">
+                <a:solidFill>
+                  <a:srgbClr val="000000"/>
+                </a:solidFill>
+                <a:latin typeface="Arial"/>
+              </a:rPr>
+              <a:t>que </a:t>
+            </a:r>
+            <a:r>
+              <a:rPr lang="es-MX" sz="2000" kern="0" dirty="0">
+                <a:solidFill>
+                  <a:srgbClr val="000000"/>
+                </a:solidFill>
+                <a:latin typeface="Arial"/>
+              </a:rPr>
+              <a:t>permita conectar clientes, proveedores de servicios, y tiendas y cadenas de ferreterías.</a:t>
             </a:r>
             <a:endParaRPr kumimoji="0" lang="pt-BR" sz="2000" b="0" i="0" u="none" strike="noStrike" kern="0" cap="none" spc="0" normalizeH="0" baseline="0" noProof="0" dirty="0" smtClean="0">
               <a:ln>

</xml_diff>